<commit_message>
[feat] Finished naive vayes and developing script for presentation
</commit_message>
<xml_diff>
--- a/docs/Practicas Sistemas Inteligentes.pptx
+++ b/docs/Practicas Sistemas Inteligentes.pptx
@@ -5,10 +5,10 @@
     <p:sldMasterId id="2147483648" r:id="rId4"/>
   </p:sldMasterIdLst>
   <p:notesMasterIdLst>
-    <p:notesMasterId r:id="rId10"/>
+    <p:notesMasterId r:id="rId11"/>
   </p:notesMasterIdLst>
   <p:handoutMasterIdLst>
-    <p:handoutMasterId r:id="rId11"/>
+    <p:handoutMasterId r:id="rId12"/>
   </p:handoutMasterIdLst>
   <p:sldIdLst>
     <p:sldId id="256" r:id="rId5"/>
@@ -16,6 +16,7 @@
     <p:sldId id="288" r:id="rId7"/>
     <p:sldId id="280" r:id="rId8"/>
     <p:sldId id="289" r:id="rId9"/>
+    <p:sldId id="290" r:id="rId10"/>
   </p:sldIdLst>
   <p:sldSz cx="12192000" cy="6858000"/>
   <p:notesSz cx="6858000" cy="9144000"/>
@@ -221,7 +222,7 @@
             <a:pPr rtl="0"/>
             <a:fld id="{0B0FAE97-1210-4E36-A60A-8BA798A12A99}" type="datetime1">
               <a:rPr lang="es-ES" smtClean="0"/>
-              <a:t>22/02/2021</a:t>
+              <a:t>25/02/2021</a:t>
             </a:fld>
             <a:endParaRPr lang="es-ES"/>
           </a:p>
@@ -391,7 +392,7 @@
             <a:pPr rtl="0"/>
             <a:fld id="{93D3D879-06F7-4BB3-9FD8-DADB216A1AB3}" type="datetime1">
               <a:rPr lang="es-ES" noProof="0" smtClean="0"/>
-              <a:t>22/02/2021</a:t>
+              <a:t>25/02/2021</a:t>
             </a:fld>
             <a:endParaRPr lang="es-ES" noProof="0"/>
           </a:p>
@@ -9542,7 +9543,7 @@
             <a:pPr rtl="0"/>
             <a:fld id="{47A5FDA7-39C6-4FBE-97F3-2D2D6DC36FCC}" type="datetime1">
               <a:rPr lang="es-ES" noProof="0" smtClean="0"/>
-              <a:t>22/02/2021</a:t>
+              <a:t>25/02/2021</a:t>
             </a:fld>
             <a:endParaRPr lang="es-ES" noProof="0"/>
           </a:p>
@@ -9746,7 +9747,7 @@
             <a:pPr rtl="0"/>
             <a:fld id="{E236EBEF-020B-4C7C-BBFB-64D3F209668E}" type="datetime1">
               <a:rPr lang="es-ES" noProof="0" smtClean="0"/>
-              <a:t>22/02/2021</a:t>
+              <a:t>25/02/2021</a:t>
             </a:fld>
             <a:endParaRPr lang="es-ES" noProof="0"/>
           </a:p>
@@ -9923,7 +9924,7 @@
             <a:pPr rtl="0"/>
             <a:fld id="{CE08ADAD-4618-4642-9A33-015FBEC8F089}" type="datetime1">
               <a:rPr lang="es-ES" noProof="0" smtClean="0"/>
-              <a:t>22/02/2021</a:t>
+              <a:t>25/02/2021</a:t>
             </a:fld>
             <a:endParaRPr lang="es-ES" noProof="0"/>
           </a:p>
@@ -10125,7 +10126,7 @@
             <a:pPr rtl="0"/>
             <a:fld id="{A338E37B-B187-4145-A5EA-9ED7CFD597C8}" type="datetime1">
               <a:rPr lang="es-ES" noProof="0" smtClean="0"/>
-              <a:t>22/02/2021</a:t>
+              <a:t>25/02/2021</a:t>
             </a:fld>
             <a:endParaRPr lang="es-ES" noProof="0"/>
           </a:p>
@@ -19021,7 +19022,7 @@
             <a:pPr rtl="0"/>
             <a:fld id="{9E67FC2D-A784-4A26-A22C-7C7941537311}" type="datetime1">
               <a:rPr lang="es-ES" noProof="0" smtClean="0"/>
-              <a:t>22/02/2021</a:t>
+              <a:t>25/02/2021</a:t>
             </a:fld>
             <a:endParaRPr lang="es-ES" noProof="0"/>
           </a:p>
@@ -19291,7 +19292,7 @@
             <a:pPr rtl="0"/>
             <a:fld id="{B4425657-32E3-4477-95DF-36B78F7A55D9}" type="datetime1">
               <a:rPr lang="es-ES" noProof="0" smtClean="0"/>
-              <a:t>22/02/2021</a:t>
+              <a:t>25/02/2021</a:t>
             </a:fld>
             <a:endParaRPr lang="es-ES" noProof="0"/>
           </a:p>
@@ -19685,7 +19686,7 @@
             <a:pPr rtl="0"/>
             <a:fld id="{809FADCC-D973-45F5-9743-8DF805DEB9A4}" type="datetime1">
               <a:rPr lang="es-ES" noProof="0" smtClean="0"/>
-              <a:t>22/02/2021</a:t>
+              <a:t>25/02/2021</a:t>
             </a:fld>
             <a:endParaRPr lang="es-ES" noProof="0"/>
           </a:p>
@@ -19801,7 +19802,7 @@
             <a:pPr rtl="0"/>
             <a:fld id="{B027A69F-13BE-454A-8E01-EDFAC664803B}" type="datetime1">
               <a:rPr lang="es-ES" noProof="0" smtClean="0"/>
-              <a:t>22/02/2021</a:t>
+              <a:t>25/02/2021</a:t>
             </a:fld>
             <a:endParaRPr lang="es-ES" noProof="0"/>
           </a:p>
@@ -19894,7 +19895,7 @@
             <a:pPr rtl="0"/>
             <a:fld id="{56E1A15B-83FA-4BBF-8DE6-A4EDFCC4A5BD}" type="datetime1">
               <a:rPr lang="es-ES" noProof="0" smtClean="0"/>
-              <a:t>22/02/2021</a:t>
+              <a:t>25/02/2021</a:t>
             </a:fld>
             <a:endParaRPr lang="es-ES" noProof="0"/>
           </a:p>
@@ -20181,7 +20182,7 @@
             <a:pPr rtl="0"/>
             <a:fld id="{7A59965A-93A2-4D3E-91DE-965937C6B77A}" type="datetime1">
               <a:rPr lang="es-ES" noProof="0" smtClean="0"/>
-              <a:t>22/02/2021</a:t>
+              <a:t>25/02/2021</a:t>
             </a:fld>
             <a:endParaRPr lang="es-ES" noProof="0"/>
           </a:p>
@@ -20459,7 +20460,7 @@
             <a:pPr rtl="0"/>
             <a:fld id="{905B47A4-AFFE-4914-B575-90A58D19FCDF}" type="datetime1">
               <a:rPr lang="es-ES" noProof="0" smtClean="0"/>
-              <a:t>22/02/2021</a:t>
+              <a:t>25/02/2021</a:t>
             </a:fld>
             <a:endParaRPr lang="es-ES" noProof="0"/>
           </a:p>
@@ -20706,7 +20707,7 @@
             <a:pPr rtl="0"/>
             <a:fld id="{E9648725-0260-4A3F-B896-A7EECA4D6771}" type="datetime1">
               <a:rPr lang="es-ES" noProof="0" smtClean="0"/>
-              <a:t>22/02/2021</a:t>
+              <a:t>25/02/2021</a:t>
             </a:fld>
             <a:endParaRPr lang="es-ES" noProof="0"/>
           </a:p>
@@ -22366,6 +22367,128 @@
 </p:sld>
 </file>
 
+<file path=ppt/slides/slide6.xml><?xml version="1.0" encoding="utf-8"?>
+<p:sld xmlns:a="http://schemas.openxmlformats.org/drawingml/2006/main" xmlns:r="http://schemas.openxmlformats.org/officeDocument/2006/relationships" xmlns:p="http://schemas.openxmlformats.org/presentationml/2006/main">
+  <p:cSld>
+    <p:spTree>
+      <p:nvGrpSpPr>
+        <p:cNvPr id="1" name=""/>
+        <p:cNvGrpSpPr/>
+        <p:nvPr/>
+      </p:nvGrpSpPr>
+      <p:grpSpPr>
+        <a:xfrm>
+          <a:off x="0" y="0"/>
+          <a:ext cx="0" cy="0"/>
+          <a:chOff x="0" y="0"/>
+          <a:chExt cx="0" cy="0"/>
+        </a:xfrm>
+      </p:grpSpPr>
+      <p:sp>
+        <p:nvSpPr>
+          <p:cNvPr id="2" name="Título 1">
+            <a:extLst>
+              <a:ext uri="{FF2B5EF4-FFF2-40B4-BE49-F238E27FC236}">
+                <a16:creationId xmlns:a16="http://schemas.microsoft.com/office/drawing/2014/main" id="{47F6FBCF-3113-4B0C-90ED-65789A0DA69C}"/>
+              </a:ext>
+            </a:extLst>
+          </p:cNvPr>
+          <p:cNvSpPr>
+            <a:spLocks noGrp="1"/>
+          </p:cNvSpPr>
+          <p:nvPr>
+            <p:ph type="title"/>
+          </p:nvPr>
+        </p:nvSpPr>
+        <p:spPr/>
+        <p:txBody>
+          <a:bodyPr/>
+          <a:lstStyle/>
+          <a:p>
+            <a:r>
+              <a:rPr lang="es-ES" dirty="0"/>
+              <a:t>Conclusiones</a:t>
+            </a:r>
+          </a:p>
+        </p:txBody>
+      </p:sp>
+      <p:sp>
+        <p:nvSpPr>
+          <p:cNvPr id="8" name="Marcador de número de diapositiva 7">
+            <a:extLst>
+              <a:ext uri="{FF2B5EF4-FFF2-40B4-BE49-F238E27FC236}">
+                <a16:creationId xmlns:a16="http://schemas.microsoft.com/office/drawing/2014/main" id="{0BE533B4-3D17-4BCD-9F4B-DE610744AF38}"/>
+              </a:ext>
+            </a:extLst>
+          </p:cNvPr>
+          <p:cNvSpPr>
+            <a:spLocks noGrp="1"/>
+          </p:cNvSpPr>
+          <p:nvPr>
+            <p:ph type="sldNum" sz="quarter" idx="12"/>
+          </p:nvPr>
+        </p:nvSpPr>
+        <p:spPr/>
+        <p:txBody>
+          <a:bodyPr/>
+          <a:lstStyle/>
+          <a:p>
+            <a:fld id="{4FAB73BC-B049-4115-A692-8D63A059BFB8}" type="slidenum">
+              <a:rPr lang="es-ES" noProof="0" smtClean="0"/>
+              <a:pPr/>
+              <a:t>6</a:t>
+            </a:fld>
+            <a:r>
+              <a:rPr lang="es-ES" dirty="0"/>
+              <a:t>/17</a:t>
+            </a:r>
+            <a:endParaRPr lang="es-ES" noProof="0" dirty="0"/>
+          </a:p>
+        </p:txBody>
+      </p:sp>
+      <p:pic>
+        <p:nvPicPr>
+          <p:cNvPr id="10" name="image2.png">
+            <a:extLst>
+              <a:ext uri="{FF2B5EF4-FFF2-40B4-BE49-F238E27FC236}">
+                <a16:creationId xmlns:a16="http://schemas.microsoft.com/office/drawing/2014/main" id="{42D56301-D2C5-449D-900B-86C004E93246}"/>
+              </a:ext>
+            </a:extLst>
+          </p:cNvPr>
+          <p:cNvPicPr/>
+          <p:nvPr/>
+        </p:nvPicPr>
+        <p:blipFill>
+          <a:blip r:embed="rId2"/>
+          <a:srcRect r="-294" b="-3234"/>
+          <a:stretch>
+            <a:fillRect/>
+          </a:stretch>
+        </p:blipFill>
+        <p:spPr>
+          <a:xfrm>
+            <a:off x="11600953" y="6297433"/>
+            <a:ext cx="587773" cy="559592"/>
+          </a:xfrm>
+          <a:prstGeom prst="rect">
+            <a:avLst/>
+          </a:prstGeom>
+          <a:ln/>
+        </p:spPr>
+      </p:pic>
+    </p:spTree>
+    <p:extLst>
+      <p:ext uri="{BB962C8B-B14F-4D97-AF65-F5344CB8AC3E}">
+        <p14:creationId xmlns:p14="http://schemas.microsoft.com/office/powerpoint/2010/main" val="386946908"/>
+      </p:ext>
+    </p:extLst>
+  </p:cSld>
+  <p:clrMapOvr>
+    <a:masterClrMapping/>
+  </p:clrMapOvr>
+</p:sld>
+</file>
+
 <file path=ppt/theme/theme1.xml><?xml version="1.0" encoding="utf-8"?>
 <a:theme xmlns:a="http://schemas.openxmlformats.org/drawingml/2006/main" name="Integral">
   <a:themeElements>
@@ -23191,6 +23314,23 @@
 </file>
 
 <file path=customXml/item1.xml><?xml version="1.0" encoding="utf-8"?>
+<?mso-contentType ?>
+<FormTemplates xmlns="http://schemas.microsoft.com/sharepoint/v3/contenttype/forms">
+  <Display>DocumentLibraryForm</Display>
+  <Edit>DocumentLibraryForm</Edit>
+  <New>DocumentLibraryForm</New>
+</FormTemplates>
+</file>
+
+<file path=customXml/item2.xml><?xml version="1.0" encoding="utf-8"?>
+<p:properties xmlns:p="http://schemas.microsoft.com/office/2006/metadata/properties" xmlns:xsi="http://www.w3.org/2001/XMLSchema-instance" xmlns:pc="http://schemas.microsoft.com/office/infopath/2007/PartnerControls">
+  <documentManagement>
+    <MediaServiceKeyPoints xmlns="71af3243-3dd4-4a8d-8c0d-dd76da1f02a5" xsi:nil="true"/>
+  </documentManagement>
+</p:properties>
+</file>
+
+<file path=customXml/item3.xml><?xml version="1.0" encoding="utf-8"?>
 <ct:contentTypeSchema xmlns:ct="http://schemas.microsoft.com/office/2006/metadata/contentType" xmlns:ma="http://schemas.microsoft.com/office/2006/metadata/properties/metaAttributes" ct:_="" ma:_="" ma:contentTypeName="Document" ma:contentTypeID="0x01010079F111ED35F8CC479449609E8A0923A6" ma:contentTypeVersion="11" ma:contentTypeDescription="Create a new document." ma:contentTypeScope="" ma:versionID="9677210f24a1be23c92c90fd886aa0aa">
   <xsd:schema xmlns:xsd="http://www.w3.org/2001/XMLSchema" xmlns:xs="http://www.w3.org/2001/XMLSchema" xmlns:p="http://schemas.microsoft.com/office/2006/metadata/properties" xmlns:ns2="71af3243-3dd4-4a8d-8c0d-dd76da1f02a5" xmlns:ns3="16c05727-aa75-4e4a-9b5f-8a80a1165891" targetNamespace="http://schemas.microsoft.com/office/2006/metadata/properties" ma:root="true" ma:fieldsID="60e05723c5c1908df1a1a4ebf11d344e" ns2:_="" ns3:_="">
     <xsd:import namespace="71af3243-3dd4-4a8d-8c0d-dd76da1f02a5"/>
@@ -23401,24 +23541,25 @@
 </ct:contentTypeSchema>
 </file>
 
-<file path=customXml/item2.xml><?xml version="1.0" encoding="utf-8"?>
-<p:properties xmlns:p="http://schemas.microsoft.com/office/2006/metadata/properties" xmlns:xsi="http://www.w3.org/2001/XMLSchema-instance" xmlns:pc="http://schemas.microsoft.com/office/infopath/2007/PartnerControls">
-  <documentManagement>
-    <MediaServiceKeyPoints xmlns="71af3243-3dd4-4a8d-8c0d-dd76da1f02a5" xsi:nil="true"/>
-  </documentManagement>
-</p:properties>
+<file path=customXml/itemProps1.xml><?xml version="1.0" encoding="utf-8"?>
+<ds:datastoreItem xmlns:ds="http://schemas.openxmlformats.org/officeDocument/2006/customXml" ds:itemID="{4F44C90D-2A62-4985-9618-3460247437B1}">
+  <ds:schemaRefs>
+    <ds:schemaRef ds:uri="http://schemas.microsoft.com/sharepoint/v3/contenttype/forms"/>
+  </ds:schemaRefs>
+</ds:datastoreItem>
 </file>
 
-<file path=customXml/item3.xml><?xml version="1.0" encoding="utf-8"?>
-<?mso-contentType ?>
-<FormTemplates xmlns="http://schemas.microsoft.com/sharepoint/v3/contenttype/forms">
-  <Display>DocumentLibraryForm</Display>
-  <Edit>DocumentLibraryForm</Edit>
-  <New>DocumentLibraryForm</New>
-</FormTemplates>
+<file path=customXml/itemProps2.xml><?xml version="1.0" encoding="utf-8"?>
+<ds:datastoreItem xmlns:ds="http://schemas.openxmlformats.org/officeDocument/2006/customXml" ds:itemID="{788A2F88-55C5-4ED1-9541-807C65424763}">
+  <ds:schemaRefs>
+    <ds:schemaRef ds:uri="http://schemas.microsoft.com/office/2006/metadata/properties"/>
+    <ds:schemaRef ds:uri="http://schemas.microsoft.com/office/infopath/2007/PartnerControls"/>
+    <ds:schemaRef ds:uri="71af3243-3dd4-4a8d-8c0d-dd76da1f02a5"/>
+  </ds:schemaRefs>
+</ds:datastoreItem>
 </file>
 
-<file path=customXml/itemProps1.xml><?xml version="1.0" encoding="utf-8"?>
+<file path=customXml/itemProps3.xml><?xml version="1.0" encoding="utf-8"?>
 <ds:datastoreItem xmlns:ds="http://schemas.openxmlformats.org/officeDocument/2006/customXml" ds:itemID="{B61EAB5F-88FC-4FAE-AE3C-037A3C365EB8}">
   <ds:schemaRefs>
     <ds:schemaRef ds:uri="http://schemas.microsoft.com/office/2006/metadata/contentType"/>
@@ -23435,22 +23576,4 @@
     <ds:schemaRef ds:uri="http://schemas.microsoft.com/internal/obd"/>
   </ds:schemaRefs>
 </ds:datastoreItem>
-</file>
-
-<file path=customXml/itemProps2.xml><?xml version="1.0" encoding="utf-8"?>
-<ds:datastoreItem xmlns:ds="http://schemas.openxmlformats.org/officeDocument/2006/customXml" ds:itemID="{788A2F88-55C5-4ED1-9541-807C65424763}">
-  <ds:schemaRefs>
-    <ds:schemaRef ds:uri="http://schemas.microsoft.com/office/2006/metadata/properties"/>
-    <ds:schemaRef ds:uri="http://schemas.microsoft.com/office/infopath/2007/PartnerControls"/>
-    <ds:schemaRef ds:uri="71af3243-3dd4-4a8d-8c0d-dd76da1f02a5"/>
-  </ds:schemaRefs>
-</ds:datastoreItem>
-</file>
-
-<file path=customXml/itemProps3.xml><?xml version="1.0" encoding="utf-8"?>
-<ds:datastoreItem xmlns:ds="http://schemas.openxmlformats.org/officeDocument/2006/customXml" ds:itemID="{4F44C90D-2A62-4985-9618-3460247437B1}">
-  <ds:schemaRefs>
-    <ds:schemaRef ds:uri="http://schemas.microsoft.com/sharepoint/v3/contenttype/forms"/>
-  </ds:schemaRefs>
-</ds:datastoreItem>
 </file>
</xml_diff>